<commit_message>
Update Clean Code - Chapter 5.pptx
Completed vertical formatting section
</commit_message>
<xml_diff>
--- a/Clean Code - Chapter 5.pptx
+++ b/Clean Code - Chapter 5.pptx
@@ -4,6 +4,9 @@
   <p:sldMasterIdLst>
     <p:sldMasterId id="2147483752" r:id="rId1"/>
   </p:sldMasterIdLst>
+  <p:notesMasterIdLst>
+    <p:notesMasterId r:id="rId15"/>
+  </p:notesMasterIdLst>
   <p:sldIdLst>
     <p:sldId id="256" r:id="rId2"/>
     <p:sldId id="257" r:id="rId3"/>
@@ -12,6 +15,12 @@
     <p:sldId id="260" r:id="rId6"/>
     <p:sldId id="261" r:id="rId7"/>
     <p:sldId id="262" r:id="rId8"/>
+    <p:sldId id="263" r:id="rId9"/>
+    <p:sldId id="264" r:id="rId10"/>
+    <p:sldId id="265" r:id="rId11"/>
+    <p:sldId id="266" r:id="rId12"/>
+    <p:sldId id="267" r:id="rId13"/>
+    <p:sldId id="268" r:id="rId14"/>
   </p:sldIdLst>
   <p:sldSz cx="12192000" cy="6858000"/>
   <p:notesSz cx="6858000" cy="9144000"/>
@@ -118,6 +127,450 @@
 </p:presentation>
 </file>
 
+<file path=ppt/notesMasters/notesMaster1.xml><?xml version="1.0" encoding="utf-8"?>
+<p:notesMaster xmlns:a="http://schemas.openxmlformats.org/drawingml/2006/main" xmlns:r="http://schemas.openxmlformats.org/officeDocument/2006/relationships" xmlns:p="http://schemas.openxmlformats.org/presentationml/2006/main">
+  <p:cSld>
+    <p:bg>
+      <p:bgRef idx="1001">
+        <a:schemeClr val="bg1"/>
+      </p:bgRef>
+    </p:bg>
+    <p:spTree>
+      <p:nvGrpSpPr>
+        <p:cNvPr id="1" name=""/>
+        <p:cNvGrpSpPr/>
+        <p:nvPr/>
+      </p:nvGrpSpPr>
+      <p:grpSpPr>
+        <a:xfrm>
+          <a:off x="0" y="0"/>
+          <a:ext cx="0" cy="0"/>
+          <a:chOff x="0" y="0"/>
+          <a:chExt cx="0" cy="0"/>
+        </a:xfrm>
+      </p:grpSpPr>
+      <p:sp>
+        <p:nvSpPr>
+          <p:cNvPr id="2" name="Header Placeholder 1"/>
+          <p:cNvSpPr>
+            <a:spLocks noGrp="1"/>
+          </p:cNvSpPr>
+          <p:nvPr>
+            <p:ph type="hdr" sz="quarter"/>
+          </p:nvPr>
+        </p:nvSpPr>
+        <p:spPr>
+          <a:xfrm>
+            <a:off x="0" y="0"/>
+            <a:ext cx="2971800" cy="458788"/>
+          </a:xfrm>
+          <a:prstGeom prst="rect">
+            <a:avLst/>
+          </a:prstGeom>
+        </p:spPr>
+        <p:txBody>
+          <a:bodyPr vert="horz" lIns="91440" tIns="45720" rIns="91440" bIns="45720" rtlCol="0"/>
+          <a:lstStyle>
+            <a:lvl1pPr algn="l">
+              <a:defRPr sz="1200"/>
+            </a:lvl1pPr>
+          </a:lstStyle>
+          <a:p>
+            <a:endParaRPr lang="en-US"/>
+          </a:p>
+        </p:txBody>
+      </p:sp>
+      <p:sp>
+        <p:nvSpPr>
+          <p:cNvPr id="3" name="Date Placeholder 2"/>
+          <p:cNvSpPr>
+            <a:spLocks noGrp="1"/>
+          </p:cNvSpPr>
+          <p:nvPr>
+            <p:ph type="dt" idx="1"/>
+          </p:nvPr>
+        </p:nvSpPr>
+        <p:spPr>
+          <a:xfrm>
+            <a:off x="3884613" y="0"/>
+            <a:ext cx="2971800" cy="458788"/>
+          </a:xfrm>
+          <a:prstGeom prst="rect">
+            <a:avLst/>
+          </a:prstGeom>
+        </p:spPr>
+        <p:txBody>
+          <a:bodyPr vert="horz" lIns="91440" tIns="45720" rIns="91440" bIns="45720" rtlCol="0"/>
+          <a:lstStyle>
+            <a:lvl1pPr algn="r">
+              <a:defRPr sz="1200"/>
+            </a:lvl1pPr>
+          </a:lstStyle>
+          <a:p>
+            <a:fld id="{AE618B39-8055-42E1-B281-C37CD74E9521}" type="datetimeFigureOut">
+              <a:rPr lang="en-US" smtClean="0"/>
+              <a:t>11-Jul-25</a:t>
+            </a:fld>
+            <a:endParaRPr lang="en-US"/>
+          </a:p>
+        </p:txBody>
+      </p:sp>
+      <p:sp>
+        <p:nvSpPr>
+          <p:cNvPr id="4" name="Slide Image Placeholder 3"/>
+          <p:cNvSpPr>
+            <a:spLocks noGrp="1" noRot="1" noChangeAspect="1"/>
+          </p:cNvSpPr>
+          <p:nvPr>
+            <p:ph type="sldImg" idx="2"/>
+          </p:nvPr>
+        </p:nvSpPr>
+        <p:spPr>
+          <a:xfrm>
+            <a:off x="685800" y="1143000"/>
+            <a:ext cx="5486400" cy="3086100"/>
+          </a:xfrm>
+          <a:prstGeom prst="rect">
+            <a:avLst/>
+          </a:prstGeom>
+          <a:noFill/>
+          <a:ln w="12700">
+            <a:solidFill>
+              <a:prstClr val="black"/>
+            </a:solidFill>
+          </a:ln>
+        </p:spPr>
+        <p:txBody>
+          <a:bodyPr vert="horz" lIns="91440" tIns="45720" rIns="91440" bIns="45720" rtlCol="0" anchor="ctr"/>
+          <a:lstStyle/>
+          <a:p>
+            <a:endParaRPr lang="en-US"/>
+          </a:p>
+        </p:txBody>
+      </p:sp>
+      <p:sp>
+        <p:nvSpPr>
+          <p:cNvPr id="5" name="Notes Placeholder 4"/>
+          <p:cNvSpPr>
+            <a:spLocks noGrp="1"/>
+          </p:cNvSpPr>
+          <p:nvPr>
+            <p:ph type="body" sz="quarter" idx="3"/>
+          </p:nvPr>
+        </p:nvSpPr>
+        <p:spPr>
+          <a:xfrm>
+            <a:off x="685800" y="4400550"/>
+            <a:ext cx="5486400" cy="3600450"/>
+          </a:xfrm>
+          <a:prstGeom prst="rect">
+            <a:avLst/>
+          </a:prstGeom>
+        </p:spPr>
+        <p:txBody>
+          <a:bodyPr vert="horz" lIns="91440" tIns="45720" rIns="91440" bIns="45720" rtlCol="0"/>
+          <a:lstStyle/>
+          <a:p>
+            <a:pPr lvl="0"/>
+            <a:r>
+              <a:rPr lang="en-US"/>
+              <a:t>Click to edit Master text styles</a:t>
+            </a:r>
+          </a:p>
+          <a:p>
+            <a:pPr lvl="1"/>
+            <a:r>
+              <a:rPr lang="en-US"/>
+              <a:t>Second level</a:t>
+            </a:r>
+          </a:p>
+          <a:p>
+            <a:pPr lvl="2"/>
+            <a:r>
+              <a:rPr lang="en-US"/>
+              <a:t>Third level</a:t>
+            </a:r>
+          </a:p>
+          <a:p>
+            <a:pPr lvl="3"/>
+            <a:r>
+              <a:rPr lang="en-US"/>
+              <a:t>Fourth level</a:t>
+            </a:r>
+          </a:p>
+          <a:p>
+            <a:pPr lvl="4"/>
+            <a:r>
+              <a:rPr lang="en-US"/>
+              <a:t>Fifth level</a:t>
+            </a:r>
+          </a:p>
+        </p:txBody>
+      </p:sp>
+      <p:sp>
+        <p:nvSpPr>
+          <p:cNvPr id="6" name="Footer Placeholder 5"/>
+          <p:cNvSpPr>
+            <a:spLocks noGrp="1"/>
+          </p:cNvSpPr>
+          <p:nvPr>
+            <p:ph type="ftr" sz="quarter" idx="4"/>
+          </p:nvPr>
+        </p:nvSpPr>
+        <p:spPr>
+          <a:xfrm>
+            <a:off x="0" y="8685213"/>
+            <a:ext cx="2971800" cy="458787"/>
+          </a:xfrm>
+          <a:prstGeom prst="rect">
+            <a:avLst/>
+          </a:prstGeom>
+        </p:spPr>
+        <p:txBody>
+          <a:bodyPr vert="horz" lIns="91440" tIns="45720" rIns="91440" bIns="45720" rtlCol="0" anchor="b"/>
+          <a:lstStyle>
+            <a:lvl1pPr algn="l">
+              <a:defRPr sz="1200"/>
+            </a:lvl1pPr>
+          </a:lstStyle>
+          <a:p>
+            <a:endParaRPr lang="en-US"/>
+          </a:p>
+        </p:txBody>
+      </p:sp>
+      <p:sp>
+        <p:nvSpPr>
+          <p:cNvPr id="7" name="Slide Number Placeholder 6"/>
+          <p:cNvSpPr>
+            <a:spLocks noGrp="1"/>
+          </p:cNvSpPr>
+          <p:nvPr>
+            <p:ph type="sldNum" sz="quarter" idx="5"/>
+          </p:nvPr>
+        </p:nvSpPr>
+        <p:spPr>
+          <a:xfrm>
+            <a:off x="3884613" y="8685213"/>
+            <a:ext cx="2971800" cy="458787"/>
+          </a:xfrm>
+          <a:prstGeom prst="rect">
+            <a:avLst/>
+          </a:prstGeom>
+        </p:spPr>
+        <p:txBody>
+          <a:bodyPr vert="horz" lIns="91440" tIns="45720" rIns="91440" bIns="45720" rtlCol="0" anchor="b"/>
+          <a:lstStyle>
+            <a:lvl1pPr algn="r">
+              <a:defRPr sz="1200"/>
+            </a:lvl1pPr>
+          </a:lstStyle>
+          <a:p>
+            <a:fld id="{3DDBB2A1-113D-4846-BF3B-E750EEF0DFFC}" type="slidenum">
+              <a:rPr lang="en-US" smtClean="0"/>
+              <a:t>‹#›</a:t>
+            </a:fld>
+            <a:endParaRPr lang="en-US"/>
+          </a:p>
+        </p:txBody>
+      </p:sp>
+    </p:spTree>
+    <p:extLst>
+      <p:ext uri="{BB962C8B-B14F-4D97-AF65-F5344CB8AC3E}">
+        <p14:creationId xmlns:p14="http://schemas.microsoft.com/office/powerpoint/2010/main" val="2099148418"/>
+      </p:ext>
+    </p:extLst>
+  </p:cSld>
+  <p:clrMap bg1="lt1" tx1="dk1" bg2="lt2" tx2="dk2" accent1="accent1" accent2="accent2" accent3="accent3" accent4="accent4" accent5="accent5" accent6="accent6" hlink="hlink" folHlink="folHlink"/>
+  <p:notesStyle>
+    <a:lvl1pPr marL="0" algn="l" defTabSz="914400" rtl="0" eaLnBrk="1" latinLnBrk="0" hangingPunct="1">
+      <a:defRPr sz="1200" kern="1200">
+        <a:solidFill>
+          <a:schemeClr val="tx1"/>
+        </a:solidFill>
+        <a:latin typeface="+mn-lt"/>
+        <a:ea typeface="+mn-ea"/>
+        <a:cs typeface="+mn-cs"/>
+      </a:defRPr>
+    </a:lvl1pPr>
+    <a:lvl2pPr marL="457200" algn="l" defTabSz="914400" rtl="0" eaLnBrk="1" latinLnBrk="0" hangingPunct="1">
+      <a:defRPr sz="1200" kern="1200">
+        <a:solidFill>
+          <a:schemeClr val="tx1"/>
+        </a:solidFill>
+        <a:latin typeface="+mn-lt"/>
+        <a:ea typeface="+mn-ea"/>
+        <a:cs typeface="+mn-cs"/>
+      </a:defRPr>
+    </a:lvl2pPr>
+    <a:lvl3pPr marL="914400" algn="l" defTabSz="914400" rtl="0" eaLnBrk="1" latinLnBrk="0" hangingPunct="1">
+      <a:defRPr sz="1200" kern="1200">
+        <a:solidFill>
+          <a:schemeClr val="tx1"/>
+        </a:solidFill>
+        <a:latin typeface="+mn-lt"/>
+        <a:ea typeface="+mn-ea"/>
+        <a:cs typeface="+mn-cs"/>
+      </a:defRPr>
+    </a:lvl3pPr>
+    <a:lvl4pPr marL="1371600" algn="l" defTabSz="914400" rtl="0" eaLnBrk="1" latinLnBrk="0" hangingPunct="1">
+      <a:defRPr sz="1200" kern="1200">
+        <a:solidFill>
+          <a:schemeClr val="tx1"/>
+        </a:solidFill>
+        <a:latin typeface="+mn-lt"/>
+        <a:ea typeface="+mn-ea"/>
+        <a:cs typeface="+mn-cs"/>
+      </a:defRPr>
+    </a:lvl4pPr>
+    <a:lvl5pPr marL="1828800" algn="l" defTabSz="914400" rtl="0" eaLnBrk="1" latinLnBrk="0" hangingPunct="1">
+      <a:defRPr sz="1200" kern="1200">
+        <a:solidFill>
+          <a:schemeClr val="tx1"/>
+        </a:solidFill>
+        <a:latin typeface="+mn-lt"/>
+        <a:ea typeface="+mn-ea"/>
+        <a:cs typeface="+mn-cs"/>
+      </a:defRPr>
+    </a:lvl5pPr>
+    <a:lvl6pPr marL="2286000" algn="l" defTabSz="914400" rtl="0" eaLnBrk="1" latinLnBrk="0" hangingPunct="1">
+      <a:defRPr sz="1200" kern="1200">
+        <a:solidFill>
+          <a:schemeClr val="tx1"/>
+        </a:solidFill>
+        <a:latin typeface="+mn-lt"/>
+        <a:ea typeface="+mn-ea"/>
+        <a:cs typeface="+mn-cs"/>
+      </a:defRPr>
+    </a:lvl6pPr>
+    <a:lvl7pPr marL="2743200" algn="l" defTabSz="914400" rtl="0" eaLnBrk="1" latinLnBrk="0" hangingPunct="1">
+      <a:defRPr sz="1200" kern="1200">
+        <a:solidFill>
+          <a:schemeClr val="tx1"/>
+        </a:solidFill>
+        <a:latin typeface="+mn-lt"/>
+        <a:ea typeface="+mn-ea"/>
+        <a:cs typeface="+mn-cs"/>
+      </a:defRPr>
+    </a:lvl7pPr>
+    <a:lvl8pPr marL="3200400" algn="l" defTabSz="914400" rtl="0" eaLnBrk="1" latinLnBrk="0" hangingPunct="1">
+      <a:defRPr sz="1200" kern="1200">
+        <a:solidFill>
+          <a:schemeClr val="tx1"/>
+        </a:solidFill>
+        <a:latin typeface="+mn-lt"/>
+        <a:ea typeface="+mn-ea"/>
+        <a:cs typeface="+mn-cs"/>
+      </a:defRPr>
+    </a:lvl8pPr>
+    <a:lvl9pPr marL="3657600" algn="l" defTabSz="914400" rtl="0" eaLnBrk="1" latinLnBrk="0" hangingPunct="1">
+      <a:defRPr sz="1200" kern="1200">
+        <a:solidFill>
+          <a:schemeClr val="tx1"/>
+        </a:solidFill>
+        <a:latin typeface="+mn-lt"/>
+        <a:ea typeface="+mn-ea"/>
+        <a:cs typeface="+mn-cs"/>
+      </a:defRPr>
+    </a:lvl9pPr>
+  </p:notesStyle>
+</p:notesMaster>
+</file>
+
+<file path=ppt/notesSlides/notesSlide1.xml><?xml version="1.0" encoding="utf-8"?>
+<p:notes xmlns:a="http://schemas.openxmlformats.org/drawingml/2006/main" xmlns:r="http://schemas.openxmlformats.org/officeDocument/2006/relationships" xmlns:p="http://schemas.openxmlformats.org/presentationml/2006/main">
+  <p:cSld>
+    <p:spTree>
+      <p:nvGrpSpPr>
+        <p:cNvPr id="1" name=""/>
+        <p:cNvGrpSpPr/>
+        <p:nvPr/>
+      </p:nvGrpSpPr>
+      <p:grpSpPr>
+        <a:xfrm>
+          <a:off x="0" y="0"/>
+          <a:ext cx="0" cy="0"/>
+          <a:chOff x="0" y="0"/>
+          <a:chExt cx="0" cy="0"/>
+        </a:xfrm>
+      </p:grpSpPr>
+      <p:sp>
+        <p:nvSpPr>
+          <p:cNvPr id="2" name="Slide Image Placeholder 1"/>
+          <p:cNvSpPr>
+            <a:spLocks noGrp="1" noRot="1" noChangeAspect="1"/>
+          </p:cNvSpPr>
+          <p:nvPr>
+            <p:ph type="sldImg"/>
+          </p:nvPr>
+        </p:nvSpPr>
+        <p:spPr/>
+      </p:sp>
+      <p:sp>
+        <p:nvSpPr>
+          <p:cNvPr id="3" name="Notes Placeholder 2"/>
+          <p:cNvSpPr>
+            <a:spLocks noGrp="1"/>
+          </p:cNvSpPr>
+          <p:nvPr>
+            <p:ph type="body" idx="1"/>
+          </p:nvPr>
+        </p:nvSpPr>
+        <p:spPr/>
+        <p:txBody>
+          <a:bodyPr/>
+          <a:lstStyle/>
+          <a:p>
+            <a:r>
+              <a:rPr lang="en-US" dirty="0"/>
+              <a:t>Languages like Pascal, C, and C++ enforce functions to be defined, or at least declared, </a:t>
+            </a:r>
+            <a:r>
+              <a:rPr lang="en-US" i="1" dirty="0"/>
+              <a:t>before</a:t>
+            </a:r>
+            <a:r>
+              <a:rPr lang="en-US" dirty="0"/>
+              <a:t> they are used.</a:t>
+            </a:r>
+          </a:p>
+        </p:txBody>
+      </p:sp>
+      <p:sp>
+        <p:nvSpPr>
+          <p:cNvPr id="4" name="Slide Number Placeholder 3"/>
+          <p:cNvSpPr>
+            <a:spLocks noGrp="1"/>
+          </p:cNvSpPr>
+          <p:nvPr>
+            <p:ph type="sldNum" sz="quarter" idx="5"/>
+          </p:nvPr>
+        </p:nvSpPr>
+        <p:spPr/>
+        <p:txBody>
+          <a:bodyPr/>
+          <a:lstStyle/>
+          <a:p>
+            <a:fld id="{3DDBB2A1-113D-4846-BF3B-E750EEF0DFFC}" type="slidenum">
+              <a:rPr lang="en-US" smtClean="0"/>
+              <a:t>13</a:t>
+            </a:fld>
+            <a:endParaRPr lang="en-US"/>
+          </a:p>
+        </p:txBody>
+      </p:sp>
+    </p:spTree>
+    <p:extLst>
+      <p:ext uri="{BB962C8B-B14F-4D97-AF65-F5344CB8AC3E}">
+        <p14:creationId xmlns:p14="http://schemas.microsoft.com/office/powerpoint/2010/main" val="106706275"/>
+      </p:ext>
+    </p:extLst>
+  </p:cSld>
+  <p:clrMapOvr>
+    <a:masterClrMapping/>
+  </p:clrMapOvr>
+</p:notes>
+</file>
+
 <file path=ppt/slideLayouts/slideLayout1.xml><?xml version="1.0" encoding="utf-8"?>
 <p:sldLayout xmlns:a="http://schemas.openxmlformats.org/drawingml/2006/main" xmlns:r="http://schemas.openxmlformats.org/officeDocument/2006/relationships" xmlns:p="http://schemas.openxmlformats.org/presentationml/2006/main" type="title" preserve="1">
   <p:cSld name="Title Slide">
@@ -265,7 +718,7 @@
           <a:p>
             <a:fld id="{82EDB8D0-98ED-4B86-9D5F-E61ADC70144D}" type="datetimeFigureOut">
               <a:rPr lang="en-US" smtClean="0"/>
-              <a:t>09-Jul-25</a:t>
+              <a:t>10-Jul-25</a:t>
             </a:fld>
             <a:endParaRPr lang="en-US" dirty="0"/>
           </a:p>
@@ -680,7 +1133,7 @@
           <a:p>
             <a:fld id="{82EDB8D0-98ED-4B86-9D5F-E61ADC70144D}" type="datetimeFigureOut">
               <a:rPr lang="en-US" smtClean="0"/>
-              <a:t>09-Jul-25</a:t>
+              <a:t>10-Jul-25</a:t>
             </a:fld>
             <a:endParaRPr lang="en-US"/>
           </a:p>
@@ -1172,7 +1625,7 @@
           <a:p>
             <a:fld id="{82EDB8D0-98ED-4B86-9D5F-E61ADC70144D}" type="datetimeFigureOut">
               <a:rPr lang="en-US" smtClean="0"/>
-              <a:t>09-Jul-25</a:t>
+              <a:t>10-Jul-25</a:t>
             </a:fld>
             <a:endParaRPr lang="en-US"/>
           </a:p>
@@ -1659,7 +2112,7 @@
           <a:p>
             <a:fld id="{82EDB8D0-98ED-4B86-9D5F-E61ADC70144D}" type="datetimeFigureOut">
               <a:rPr lang="en-US" smtClean="0"/>
-              <a:t>09-Jul-25</a:t>
+              <a:t>10-Jul-25</a:t>
             </a:fld>
             <a:endParaRPr lang="en-US" dirty="0"/>
           </a:p>
@@ -2428,7 +2881,7 @@
           <a:p>
             <a:fld id="{82EDB8D0-98ED-4B86-9D5F-E61ADC70144D}" type="datetimeFigureOut">
               <a:rPr lang="en-US" smtClean="0"/>
-              <a:t>09-Jul-25</a:t>
+              <a:t>10-Jul-25</a:t>
             </a:fld>
             <a:endParaRPr lang="en-US"/>
           </a:p>
@@ -2910,7 +3363,7 @@
           <a:p>
             <a:fld id="{82EDB8D0-98ED-4B86-9D5F-E61ADC70144D}" type="datetimeFigureOut">
               <a:rPr lang="en-US" smtClean="0"/>
-              <a:t>09-Jul-25</a:t>
+              <a:t>10-Jul-25</a:t>
             </a:fld>
             <a:endParaRPr lang="en-US"/>
           </a:p>
@@ -3606,7 +4059,7 @@
           <a:p>
             <a:fld id="{82EDB8D0-98ED-4B86-9D5F-E61ADC70144D}" type="datetimeFigureOut">
               <a:rPr lang="en-US" smtClean="0"/>
-              <a:t>09-Jul-25</a:t>
+              <a:t>10-Jul-25</a:t>
             </a:fld>
             <a:endParaRPr lang="en-US"/>
           </a:p>
@@ -4031,7 +4484,7 @@
           <a:p>
             <a:fld id="{82EDB8D0-98ED-4B86-9D5F-E61ADC70144D}" type="datetimeFigureOut">
               <a:rPr lang="en-US" smtClean="0"/>
-              <a:t>09-Jul-25</a:t>
+              <a:t>10-Jul-25</a:t>
             </a:fld>
             <a:endParaRPr lang="en-US"/>
           </a:p>
@@ -4428,7 +4881,7 @@
           <a:p>
             <a:fld id="{82EDB8D0-98ED-4B86-9D5F-E61ADC70144D}" type="datetimeFigureOut">
               <a:rPr lang="en-US" smtClean="0"/>
-              <a:t>09-Jul-25</a:t>
+              <a:t>10-Jul-25</a:t>
             </a:fld>
             <a:endParaRPr lang="en-US"/>
           </a:p>
@@ -5023,7 +5476,7 @@
           <a:p>
             <a:fld id="{82EDB8D0-98ED-4B86-9D5F-E61ADC70144D}" type="datetimeFigureOut">
               <a:rPr lang="en-US" smtClean="0"/>
-              <a:t>09-Jul-25</a:t>
+              <a:t>10-Jul-25</a:t>
             </a:fld>
             <a:endParaRPr lang="en-US"/>
           </a:p>
@@ -5598,7 +6051,7 @@
           <a:p>
             <a:fld id="{82EDB8D0-98ED-4B86-9D5F-E61ADC70144D}" type="datetimeFigureOut">
               <a:rPr lang="en-US" smtClean="0"/>
-              <a:t>09-Jul-25</a:t>
+              <a:t>10-Jul-25</a:t>
             </a:fld>
             <a:endParaRPr lang="en-US"/>
           </a:p>
@@ -6125,7 +6578,7 @@
             <a:fld id="{82EDB8D0-98ED-4B86-9D5F-E61ADC70144D}" type="datetimeFigureOut">
               <a:rPr lang="en-US" smtClean="0"/>
               <a:pPr/>
-              <a:t>09-Jul-25</a:t>
+              <a:t>10-Jul-25</a:t>
             </a:fld>
             <a:endParaRPr lang="en-US" dirty="0"/>
           </a:p>
@@ -7042,6 +7495,1030 @@
 </p:sld>
 </file>
 
+<file path=ppt/slides/slide10.xml><?xml version="1.0" encoding="utf-8"?>
+<p:sld xmlns:a="http://schemas.openxmlformats.org/drawingml/2006/main" xmlns:r="http://schemas.openxmlformats.org/officeDocument/2006/relationships" xmlns:p="http://schemas.openxmlformats.org/presentationml/2006/main">
+  <p:cSld>
+    <p:spTree>
+      <p:nvGrpSpPr>
+        <p:cNvPr id="1" name=""/>
+        <p:cNvGrpSpPr/>
+        <p:nvPr/>
+      </p:nvGrpSpPr>
+      <p:grpSpPr>
+        <a:xfrm>
+          <a:off x="0" y="0"/>
+          <a:ext cx="0" cy="0"/>
+          <a:chOff x="0" y="0"/>
+          <a:chExt cx="0" cy="0"/>
+        </a:xfrm>
+      </p:grpSpPr>
+      <p:sp>
+        <p:nvSpPr>
+          <p:cNvPr id="2" name="Title 1">
+            <a:extLst>
+              <a:ext uri="{FF2B5EF4-FFF2-40B4-BE49-F238E27FC236}">
+                <a16:creationId xmlns:a16="http://schemas.microsoft.com/office/drawing/2014/main" id="{9E9FBFB2-9A66-F2D7-FA65-2B3E86694810}"/>
+              </a:ext>
+            </a:extLst>
+          </p:cNvPr>
+          <p:cNvSpPr>
+            <a:spLocks noGrp="1"/>
+          </p:cNvSpPr>
+          <p:nvPr>
+            <p:ph type="title"/>
+          </p:nvPr>
+        </p:nvSpPr>
+        <p:spPr/>
+        <p:txBody>
+          <a:bodyPr/>
+          <a:lstStyle/>
+          <a:p>
+            <a:r>
+              <a:rPr lang="en-US" dirty="0"/>
+              <a:t>Vertical Formatting – Vertical Distance – Instance variables</a:t>
+            </a:r>
+          </a:p>
+        </p:txBody>
+      </p:sp>
+      <p:sp>
+        <p:nvSpPr>
+          <p:cNvPr id="3" name="Content Placeholder 2">
+            <a:extLst>
+              <a:ext uri="{FF2B5EF4-FFF2-40B4-BE49-F238E27FC236}">
+                <a16:creationId xmlns:a16="http://schemas.microsoft.com/office/drawing/2014/main" id="{3637CC5C-7C40-EFB8-0767-2EF13020248A}"/>
+              </a:ext>
+            </a:extLst>
+          </p:cNvPr>
+          <p:cNvSpPr>
+            <a:spLocks noGrp="1"/>
+          </p:cNvSpPr>
+          <p:nvPr>
+            <p:ph idx="1"/>
+          </p:nvPr>
+        </p:nvSpPr>
+        <p:spPr/>
+        <p:txBody>
+          <a:bodyPr/>
+          <a:lstStyle/>
+          <a:p>
+            <a:endParaRPr lang="en-US" dirty="0"/>
+          </a:p>
+          <a:p>
+            <a:r>
+              <a:rPr lang="en-US" dirty="0"/>
+              <a:t>On the other hand, should be declared at the top of the class.</a:t>
+            </a:r>
+          </a:p>
+          <a:p>
+            <a:endParaRPr lang="en-US" dirty="0"/>
+          </a:p>
+          <a:p>
+            <a:r>
+              <a:rPr lang="en-US" dirty="0"/>
+              <a:t>This shouldn’t increase the vertical distance of these variables.</a:t>
+            </a:r>
+          </a:p>
+          <a:p>
+            <a:endParaRPr lang="en-US" dirty="0"/>
+          </a:p>
+          <a:p>
+            <a:r>
+              <a:rPr lang="en-US" dirty="0"/>
+              <a:t>They should be declared in one well-known place.</a:t>
+            </a:r>
+          </a:p>
+        </p:txBody>
+      </p:sp>
+    </p:spTree>
+    <p:extLst>
+      <p:ext uri="{BB962C8B-B14F-4D97-AF65-F5344CB8AC3E}">
+        <p14:creationId xmlns:p14="http://schemas.microsoft.com/office/powerpoint/2010/main" val="4163594988"/>
+      </p:ext>
+    </p:extLst>
+  </p:cSld>
+  <p:clrMapOvr>
+    <a:masterClrMapping/>
+  </p:clrMapOvr>
+</p:sld>
+</file>
+
+<file path=ppt/slides/slide11.xml><?xml version="1.0" encoding="utf-8"?>
+<p:sld xmlns:a="http://schemas.openxmlformats.org/drawingml/2006/main" xmlns:r="http://schemas.openxmlformats.org/officeDocument/2006/relationships" xmlns:p="http://schemas.openxmlformats.org/presentationml/2006/main">
+  <p:cSld>
+    <p:spTree>
+      <p:nvGrpSpPr>
+        <p:cNvPr id="1" name=""/>
+        <p:cNvGrpSpPr/>
+        <p:nvPr/>
+      </p:nvGrpSpPr>
+      <p:grpSpPr>
+        <a:xfrm>
+          <a:off x="0" y="0"/>
+          <a:ext cx="0" cy="0"/>
+          <a:chOff x="0" y="0"/>
+          <a:chExt cx="0" cy="0"/>
+        </a:xfrm>
+      </p:grpSpPr>
+      <p:sp>
+        <p:nvSpPr>
+          <p:cNvPr id="2" name="Title 1">
+            <a:extLst>
+              <a:ext uri="{FF2B5EF4-FFF2-40B4-BE49-F238E27FC236}">
+                <a16:creationId xmlns:a16="http://schemas.microsoft.com/office/drawing/2014/main" id="{C72D2DC0-736E-F438-C0AA-FFBA38E2E00D}"/>
+              </a:ext>
+            </a:extLst>
+          </p:cNvPr>
+          <p:cNvSpPr>
+            <a:spLocks noGrp="1"/>
+          </p:cNvSpPr>
+          <p:nvPr>
+            <p:ph type="title"/>
+          </p:nvPr>
+        </p:nvSpPr>
+        <p:spPr/>
+        <p:txBody>
+          <a:bodyPr/>
+          <a:lstStyle/>
+          <a:p>
+            <a:r>
+              <a:rPr lang="en-US" dirty="0"/>
+              <a:t>Vertical Formatting – Vertical Distance – Dependent Functions</a:t>
+            </a:r>
+          </a:p>
+        </p:txBody>
+      </p:sp>
+      <p:sp>
+        <p:nvSpPr>
+          <p:cNvPr id="3" name="Content Placeholder 2">
+            <a:extLst>
+              <a:ext uri="{FF2B5EF4-FFF2-40B4-BE49-F238E27FC236}">
+                <a16:creationId xmlns:a16="http://schemas.microsoft.com/office/drawing/2014/main" id="{1B0D34BA-F64B-4320-DA50-361779E6EF95}"/>
+              </a:ext>
+            </a:extLst>
+          </p:cNvPr>
+          <p:cNvSpPr>
+            <a:spLocks noGrp="1"/>
+          </p:cNvSpPr>
+          <p:nvPr>
+            <p:ph idx="1"/>
+          </p:nvPr>
+        </p:nvSpPr>
+        <p:spPr/>
+        <p:txBody>
+          <a:bodyPr/>
+          <a:lstStyle/>
+          <a:p>
+            <a:endParaRPr lang="en-US" dirty="0"/>
+          </a:p>
+          <a:p>
+            <a:r>
+              <a:rPr lang="en-US" dirty="0"/>
+              <a:t>If one function calls another, they should be vertically close.</a:t>
+            </a:r>
+          </a:p>
+          <a:p>
+            <a:endParaRPr lang="en-US" dirty="0"/>
+          </a:p>
+          <a:p>
+            <a:r>
+              <a:rPr lang="en-US" dirty="0"/>
+              <a:t>The caller should be above the callee, if at all possible.</a:t>
+            </a:r>
+          </a:p>
+          <a:p>
+            <a:pPr lvl="1"/>
+            <a:r>
+              <a:rPr lang="en-US" dirty="0"/>
+              <a:t>This gives the program a natural flow.</a:t>
+            </a:r>
+          </a:p>
+        </p:txBody>
+      </p:sp>
+    </p:spTree>
+    <p:extLst>
+      <p:ext uri="{BB962C8B-B14F-4D97-AF65-F5344CB8AC3E}">
+        <p14:creationId xmlns:p14="http://schemas.microsoft.com/office/powerpoint/2010/main" val="3699024118"/>
+      </p:ext>
+    </p:extLst>
+  </p:cSld>
+  <p:clrMapOvr>
+    <a:masterClrMapping/>
+  </p:clrMapOvr>
+</p:sld>
+</file>
+
+<file path=ppt/slides/slide12.xml><?xml version="1.0" encoding="utf-8"?>
+<p:sld xmlns:a="http://schemas.openxmlformats.org/drawingml/2006/main" xmlns:r="http://schemas.openxmlformats.org/officeDocument/2006/relationships" xmlns:p="http://schemas.openxmlformats.org/presentationml/2006/main">
+  <p:cSld>
+    <p:bg>
+      <p:bgPr>
+        <a:solidFill>
+          <a:schemeClr val="bg1"/>
+        </a:solidFill>
+        <a:effectLst/>
+      </p:bgPr>
+    </p:bg>
+    <p:spTree>
+      <p:nvGrpSpPr>
+        <p:cNvPr id="1" name=""/>
+        <p:cNvGrpSpPr/>
+        <p:nvPr/>
+      </p:nvGrpSpPr>
+      <p:grpSpPr>
+        <a:xfrm>
+          <a:off x="0" y="0"/>
+          <a:ext cx="0" cy="0"/>
+          <a:chOff x="0" y="0"/>
+          <a:chExt cx="0" cy="0"/>
+        </a:xfrm>
+      </p:grpSpPr>
+      <p:sp useBgFill="1">
+        <p:nvSpPr>
+          <p:cNvPr id="10" name="Rectangle 9">
+            <a:extLst>
+              <a:ext uri="{FF2B5EF4-FFF2-40B4-BE49-F238E27FC236}">
+                <a16:creationId xmlns:a16="http://schemas.microsoft.com/office/drawing/2014/main" id="{4AC6B390-BC59-4F1D-A0EE-D71A92F0A0B2}"/>
+              </a:ext>
+              <a:ext uri="{C183D7F6-B498-43B3-948B-1728B52AA6E4}">
+                <adec:decorative xmlns:adec="http://schemas.microsoft.com/office/drawing/2017/decorative" val="1"/>
+              </a:ext>
+            </a:extLst>
+          </p:cNvPr>
+          <p:cNvSpPr>
+            <a:spLocks noGrp="1" noRot="1" noChangeAspect="1" noMove="1" noResize="1" noEditPoints="1" noAdjustHandles="1" noChangeArrowheads="1" noChangeShapeType="1" noTextEdit="1"/>
+          </p:cNvSpPr>
+          <p:nvPr>
+            <p:extLst>
+              <p:ext uri="{386F3935-93C4-4BCD-93E2-E3B085C9AB24}">
+                <p16:designElem xmlns:p16="http://schemas.microsoft.com/office/powerpoint/2015/main" val="1"/>
+              </p:ext>
+            </p:extLst>
+          </p:nvPr>
+        </p:nvSpPr>
+        <p:spPr bwMode="white">
+          <a:xfrm>
+            <a:off x="0" y="0"/>
+            <a:ext cx="12192000" cy="6858000"/>
+          </a:xfrm>
+          <a:prstGeom prst="rect">
+            <a:avLst/>
+          </a:prstGeom>
+          <a:ln>
+            <a:noFill/>
+          </a:ln>
+        </p:spPr>
+        <p:style>
+          <a:lnRef idx="2">
+            <a:schemeClr val="accent1">
+              <a:shade val="50000"/>
+            </a:schemeClr>
+          </a:lnRef>
+          <a:fillRef idx="1">
+            <a:schemeClr val="accent1"/>
+          </a:fillRef>
+          <a:effectRef idx="0">
+            <a:schemeClr val="accent1"/>
+          </a:effectRef>
+          <a:fontRef idx="minor">
+            <a:schemeClr val="lt1"/>
+          </a:fontRef>
+        </p:style>
+        <p:txBody>
+          <a:bodyPr rtlCol="0" anchor="ctr"/>
+          <a:lstStyle>
+            <a:defPPr>
+              <a:defRPr lang="en-US"/>
+            </a:defPPr>
+            <a:lvl1pPr marL="0" algn="l" defTabSz="914400" rtl="0" eaLnBrk="1" latinLnBrk="0" hangingPunct="1">
+              <a:defRPr sz="1800" kern="1200">
+                <a:solidFill>
+                  <a:schemeClr val="lt1"/>
+                </a:solidFill>
+                <a:latin typeface="+mn-lt"/>
+                <a:ea typeface="+mn-ea"/>
+                <a:cs typeface="+mn-cs"/>
+              </a:defRPr>
+            </a:lvl1pPr>
+            <a:lvl2pPr marL="457200" algn="l" defTabSz="914400" rtl="0" eaLnBrk="1" latinLnBrk="0" hangingPunct="1">
+              <a:defRPr sz="1800" kern="1200">
+                <a:solidFill>
+                  <a:schemeClr val="lt1"/>
+                </a:solidFill>
+                <a:latin typeface="+mn-lt"/>
+                <a:ea typeface="+mn-ea"/>
+                <a:cs typeface="+mn-cs"/>
+              </a:defRPr>
+            </a:lvl2pPr>
+            <a:lvl3pPr marL="914400" algn="l" defTabSz="914400" rtl="0" eaLnBrk="1" latinLnBrk="0" hangingPunct="1">
+              <a:defRPr sz="1800" kern="1200">
+                <a:solidFill>
+                  <a:schemeClr val="lt1"/>
+                </a:solidFill>
+                <a:latin typeface="+mn-lt"/>
+                <a:ea typeface="+mn-ea"/>
+                <a:cs typeface="+mn-cs"/>
+              </a:defRPr>
+            </a:lvl3pPr>
+            <a:lvl4pPr marL="1371600" algn="l" defTabSz="914400" rtl="0" eaLnBrk="1" latinLnBrk="0" hangingPunct="1">
+              <a:defRPr sz="1800" kern="1200">
+                <a:solidFill>
+                  <a:schemeClr val="lt1"/>
+                </a:solidFill>
+                <a:latin typeface="+mn-lt"/>
+                <a:ea typeface="+mn-ea"/>
+                <a:cs typeface="+mn-cs"/>
+              </a:defRPr>
+            </a:lvl4pPr>
+            <a:lvl5pPr marL="1828800" algn="l" defTabSz="914400" rtl="0" eaLnBrk="1" latinLnBrk="0" hangingPunct="1">
+              <a:defRPr sz="1800" kern="1200">
+                <a:solidFill>
+                  <a:schemeClr val="lt1"/>
+                </a:solidFill>
+                <a:latin typeface="+mn-lt"/>
+                <a:ea typeface="+mn-ea"/>
+                <a:cs typeface="+mn-cs"/>
+              </a:defRPr>
+            </a:lvl5pPr>
+            <a:lvl6pPr marL="2286000" algn="l" defTabSz="914400" rtl="0" eaLnBrk="1" latinLnBrk="0" hangingPunct="1">
+              <a:defRPr sz="1800" kern="1200">
+                <a:solidFill>
+                  <a:schemeClr val="lt1"/>
+                </a:solidFill>
+                <a:latin typeface="+mn-lt"/>
+                <a:ea typeface="+mn-ea"/>
+                <a:cs typeface="+mn-cs"/>
+              </a:defRPr>
+            </a:lvl6pPr>
+            <a:lvl7pPr marL="2743200" algn="l" defTabSz="914400" rtl="0" eaLnBrk="1" latinLnBrk="0" hangingPunct="1">
+              <a:defRPr sz="1800" kern="1200">
+                <a:solidFill>
+                  <a:schemeClr val="lt1"/>
+                </a:solidFill>
+                <a:latin typeface="+mn-lt"/>
+                <a:ea typeface="+mn-ea"/>
+                <a:cs typeface="+mn-cs"/>
+              </a:defRPr>
+            </a:lvl7pPr>
+            <a:lvl8pPr marL="3200400" algn="l" defTabSz="914400" rtl="0" eaLnBrk="1" latinLnBrk="0" hangingPunct="1">
+              <a:defRPr sz="1800" kern="1200">
+                <a:solidFill>
+                  <a:schemeClr val="lt1"/>
+                </a:solidFill>
+                <a:latin typeface="+mn-lt"/>
+                <a:ea typeface="+mn-ea"/>
+                <a:cs typeface="+mn-cs"/>
+              </a:defRPr>
+            </a:lvl8pPr>
+            <a:lvl9pPr marL="3657600" algn="l" defTabSz="914400" rtl="0" eaLnBrk="1" latinLnBrk="0" hangingPunct="1">
+              <a:defRPr sz="1800" kern="1200">
+                <a:solidFill>
+                  <a:schemeClr val="lt1"/>
+                </a:solidFill>
+                <a:latin typeface="+mn-lt"/>
+                <a:ea typeface="+mn-ea"/>
+                <a:cs typeface="+mn-cs"/>
+              </a:defRPr>
+            </a:lvl9pPr>
+          </a:lstStyle>
+          <a:p>
+            <a:pPr marL="0" marR="0" lvl="0" indent="0" algn="ctr" defTabSz="914400" rtl="0" eaLnBrk="1" fontAlgn="auto" latinLnBrk="0" hangingPunct="1">
+              <a:lnSpc>
+                <a:spcPct val="100000"/>
+              </a:lnSpc>
+              <a:spcBef>
+                <a:spcPts val="0"/>
+              </a:spcBef>
+              <a:spcAft>
+                <a:spcPts val="0"/>
+              </a:spcAft>
+              <a:buClrTx/>
+              <a:buSzTx/>
+              <a:buFontTx/>
+              <a:buNone/>
+              <a:tabLst/>
+              <a:defRPr/>
+            </a:pPr>
+            <a:endParaRPr kumimoji="0" lang="en-US" sz="1800" b="0" i="0" u="none" strike="noStrike" kern="1200" cap="none" spc="0" normalizeH="0" baseline="0" noProof="0">
+              <a:ln>
+                <a:noFill/>
+              </a:ln>
+              <a:solidFill>
+                <a:prstClr val="white"/>
+              </a:solidFill>
+              <a:effectLst/>
+              <a:uLnTx/>
+              <a:uFillTx/>
+              <a:latin typeface="Calibri" panose="020F0502020204030204"/>
+              <a:ea typeface="+mn-ea"/>
+              <a:cs typeface="+mn-cs"/>
+            </a:endParaRPr>
+          </a:p>
+        </p:txBody>
+      </p:sp>
+      <p:sp>
+        <p:nvSpPr>
+          <p:cNvPr id="12" name="Freeform: Shape 11">
+            <a:extLst>
+              <a:ext uri="{FF2B5EF4-FFF2-40B4-BE49-F238E27FC236}">
+                <a16:creationId xmlns:a16="http://schemas.microsoft.com/office/drawing/2014/main" id="{B6C60D79-16F1-4C4B-B7E3-7634E7069CDE}"/>
+              </a:ext>
+              <a:ext uri="{C183D7F6-B498-43B3-948B-1728B52AA6E4}">
+                <adec:decorative xmlns:adec="http://schemas.microsoft.com/office/drawing/2017/decorative" val="1"/>
+              </a:ext>
+            </a:extLst>
+          </p:cNvPr>
+          <p:cNvSpPr>
+            <a:spLocks noGrp="1" noRot="1" noChangeAspect="1" noMove="1" noResize="1" noEditPoints="1" noAdjustHandles="1" noChangeArrowheads="1" noChangeShapeType="1" noTextEdit="1"/>
+          </p:cNvSpPr>
+          <p:nvPr>
+            <p:extLst>
+              <p:ext uri="{386F3935-93C4-4BCD-93E2-E3B085C9AB24}">
+                <p16:designElem xmlns:p16="http://schemas.microsoft.com/office/powerpoint/2015/main" val="1"/>
+              </p:ext>
+            </p:extLst>
+          </p:nvPr>
+        </p:nvSpPr>
+        <p:spPr>
+          <a:xfrm>
+            <a:off x="9519137" y="5486400"/>
+            <a:ext cx="2672863" cy="1371600"/>
+          </a:xfrm>
+          <a:custGeom>
+            <a:avLst/>
+            <a:gdLst>
+              <a:gd name="connsiteX0" fmla="*/ 1721734 w 2672863"/>
+              <a:gd name="connsiteY0" fmla="*/ 0 h 1371600"/>
+              <a:gd name="connsiteX1" fmla="*/ 2564444 w 2672863"/>
+              <a:gd name="connsiteY1" fmla="*/ 213382 h 1371600"/>
+              <a:gd name="connsiteX2" fmla="*/ 2672863 w 2672863"/>
+              <a:gd name="connsiteY2" fmla="*/ 279248 h 1371600"/>
+              <a:gd name="connsiteX3" fmla="*/ 2672863 w 2672863"/>
+              <a:gd name="connsiteY3" fmla="*/ 1371600 h 1371600"/>
+              <a:gd name="connsiteX4" fmla="*/ 0 w 2672863"/>
+              <a:gd name="connsiteY4" fmla="*/ 1371600 h 1371600"/>
+              <a:gd name="connsiteX5" fmla="*/ 33268 w 2672863"/>
+              <a:gd name="connsiteY5" fmla="*/ 1242216 h 1371600"/>
+              <a:gd name="connsiteX6" fmla="*/ 1721734 w 2672863"/>
+              <a:gd name="connsiteY6" fmla="*/ 0 h 1371600"/>
+            </a:gdLst>
+            <a:ahLst/>
+            <a:cxnLst>
+              <a:cxn ang="0">
+                <a:pos x="connsiteX0" y="connsiteY0"/>
+              </a:cxn>
+              <a:cxn ang="0">
+                <a:pos x="connsiteX1" y="connsiteY1"/>
+              </a:cxn>
+              <a:cxn ang="0">
+                <a:pos x="connsiteX2" y="connsiteY2"/>
+              </a:cxn>
+              <a:cxn ang="0">
+                <a:pos x="connsiteX3" y="connsiteY3"/>
+              </a:cxn>
+              <a:cxn ang="0">
+                <a:pos x="connsiteX4" y="connsiteY4"/>
+              </a:cxn>
+              <a:cxn ang="0">
+                <a:pos x="connsiteX5" y="connsiteY5"/>
+              </a:cxn>
+              <a:cxn ang="0">
+                <a:pos x="connsiteX6" y="connsiteY6"/>
+              </a:cxn>
+            </a:cxnLst>
+            <a:rect l="l" t="t" r="r" b="b"/>
+            <a:pathLst>
+              <a:path w="2672863" h="1371600">
+                <a:moveTo>
+                  <a:pt x="1721734" y="0"/>
+                </a:moveTo>
+                <a:cubicBezTo>
+                  <a:pt x="2026863" y="0"/>
+                  <a:pt x="2313937" y="77299"/>
+                  <a:pt x="2564444" y="213382"/>
+                </a:cubicBezTo>
+                <a:lnTo>
+                  <a:pt x="2672863" y="279248"/>
+                </a:lnTo>
+                <a:lnTo>
+                  <a:pt x="2672863" y="1371600"/>
+                </a:lnTo>
+                <a:lnTo>
+                  <a:pt x="0" y="1371600"/>
+                </a:lnTo>
+                <a:lnTo>
+                  <a:pt x="33268" y="1242216"/>
+                </a:lnTo>
+                <a:cubicBezTo>
+                  <a:pt x="257110" y="522539"/>
+                  <a:pt x="928399" y="0"/>
+                  <a:pt x="1721734" y="0"/>
+                </a:cubicBezTo>
+                <a:close/>
+              </a:path>
+            </a:pathLst>
+          </a:custGeom>
+          <a:solidFill>
+            <a:schemeClr val="accent4"/>
+          </a:solidFill>
+          <a:ln>
+            <a:noFill/>
+          </a:ln>
+        </p:spPr>
+        <p:style>
+          <a:lnRef idx="2">
+            <a:schemeClr val="accent1">
+              <a:shade val="50000"/>
+            </a:schemeClr>
+          </a:lnRef>
+          <a:fillRef idx="1">
+            <a:schemeClr val="accent1"/>
+          </a:fillRef>
+          <a:effectRef idx="0">
+            <a:schemeClr val="accent1"/>
+          </a:effectRef>
+          <a:fontRef idx="minor">
+            <a:schemeClr val="lt1"/>
+          </a:fontRef>
+        </p:style>
+        <p:txBody>
+          <a:bodyPr wrap="square" rtlCol="0" anchor="ctr">
+            <a:noAutofit/>
+          </a:bodyPr>
+          <a:lstStyle/>
+          <a:p>
+            <a:pPr marL="0" marR="0" lvl="0" indent="0" algn="ctr" defTabSz="914400" rtl="0" eaLnBrk="1" fontAlgn="auto" latinLnBrk="0" hangingPunct="1">
+              <a:lnSpc>
+                <a:spcPct val="100000"/>
+              </a:lnSpc>
+              <a:spcBef>
+                <a:spcPts val="0"/>
+              </a:spcBef>
+              <a:spcAft>
+                <a:spcPts val="0"/>
+              </a:spcAft>
+              <a:buClrTx/>
+              <a:buSzTx/>
+              <a:buFontTx/>
+              <a:buNone/>
+              <a:tabLst/>
+              <a:defRPr/>
+            </a:pPr>
+            <a:endParaRPr kumimoji="0" lang="en-US" sz="1800" b="0" i="0" u="none" strike="noStrike" kern="1200" cap="none" spc="0" normalizeH="0" baseline="0" noProof="0">
+              <a:ln>
+                <a:noFill/>
+              </a:ln>
+              <a:solidFill>
+                <a:prstClr val="white"/>
+              </a:solidFill>
+              <a:effectLst/>
+              <a:uLnTx/>
+              <a:uFillTx/>
+              <a:latin typeface="Calibri" panose="020F0502020204030204"/>
+              <a:ea typeface="+mn-ea"/>
+              <a:cs typeface="+mn-cs"/>
+            </a:endParaRPr>
+          </a:p>
+        </p:txBody>
+      </p:sp>
+      <p:pic>
+        <p:nvPicPr>
+          <p:cNvPr id="5" name="Picture 4" descr="A screenshot of a computer code&#10;&#10;Description automatically generated">
+            <a:extLst>
+              <a:ext uri="{FF2B5EF4-FFF2-40B4-BE49-F238E27FC236}">
+                <a16:creationId xmlns:a16="http://schemas.microsoft.com/office/drawing/2014/main" id="{8790EAE2-59B8-2B50-434B-77C625EFD9D4}"/>
+              </a:ext>
+            </a:extLst>
+          </p:cNvPr>
+          <p:cNvPicPr>
+            <a:picLocks noChangeAspect="1"/>
+          </p:cNvPicPr>
+          <p:nvPr/>
+        </p:nvPicPr>
+        <p:blipFill>
+          <a:blip r:embed="rId2">
+            <a:extLst>
+              <a:ext uri="{28A0092B-C50C-407E-A947-70E740481C1C}">
+                <a14:useLocalDpi xmlns:a14="http://schemas.microsoft.com/office/drawing/2010/main" val="0"/>
+              </a:ext>
+            </a:extLst>
+          </a:blip>
+          <a:stretch>
+            <a:fillRect/>
+          </a:stretch>
+        </p:blipFill>
+        <p:spPr>
+          <a:xfrm>
+            <a:off x="6541053" y="2100527"/>
+            <a:ext cx="4777381" cy="2484237"/>
+          </a:xfrm>
+          <a:custGeom>
+            <a:avLst/>
+            <a:gdLst/>
+            <a:ahLst/>
+            <a:cxnLst/>
+            <a:rect l="l" t="t" r="r" b="b"/>
+            <a:pathLst>
+              <a:path w="4777381" h="5643794">
+                <a:moveTo>
+                  <a:pt x="143704" y="0"/>
+                </a:moveTo>
+                <a:lnTo>
+                  <a:pt x="4633677" y="0"/>
+                </a:lnTo>
+                <a:cubicBezTo>
+                  <a:pt x="4713043" y="0"/>
+                  <a:pt x="4777381" y="64338"/>
+                  <a:pt x="4777381" y="143704"/>
+                </a:cubicBezTo>
+                <a:lnTo>
+                  <a:pt x="4777381" y="5500090"/>
+                </a:lnTo>
+                <a:cubicBezTo>
+                  <a:pt x="4777381" y="5579456"/>
+                  <a:pt x="4713043" y="5643794"/>
+                  <a:pt x="4633677" y="5643794"/>
+                </a:cubicBezTo>
+                <a:lnTo>
+                  <a:pt x="143704" y="5643794"/>
+                </a:lnTo>
+                <a:cubicBezTo>
+                  <a:pt x="64338" y="5643794"/>
+                  <a:pt x="0" y="5579456"/>
+                  <a:pt x="0" y="5500090"/>
+                </a:cubicBezTo>
+                <a:lnTo>
+                  <a:pt x="0" y="143704"/>
+                </a:lnTo>
+                <a:cubicBezTo>
+                  <a:pt x="0" y="64338"/>
+                  <a:pt x="64338" y="0"/>
+                  <a:pt x="143704" y="0"/>
+                </a:cubicBezTo>
+                <a:close/>
+              </a:path>
+            </a:pathLst>
+          </a:custGeom>
+        </p:spPr>
+      </p:pic>
+      <p:sp>
+        <p:nvSpPr>
+          <p:cNvPr id="14" name="Arc 13">
+            <a:extLst>
+              <a:ext uri="{FF2B5EF4-FFF2-40B4-BE49-F238E27FC236}">
+                <a16:creationId xmlns:a16="http://schemas.microsoft.com/office/drawing/2014/main" id="{426B127E-6498-4C77-9C9D-4553A5113B80}"/>
+              </a:ext>
+              <a:ext uri="{C183D7F6-B498-43B3-948B-1728B52AA6E4}">
+                <adec:decorative xmlns:adec="http://schemas.microsoft.com/office/drawing/2017/decorative" val="1"/>
+              </a:ext>
+            </a:extLst>
+          </p:cNvPr>
+          <p:cNvSpPr>
+            <a:spLocks noGrp="1" noRot="1" noChangeAspect="1" noMove="1" noResize="1" noEditPoints="1" noAdjustHandles="1" noChangeArrowheads="1" noChangeShapeType="1" noTextEdit="1"/>
+          </p:cNvSpPr>
+          <p:nvPr>
+            <p:extLst>
+              <p:ext uri="{386F3935-93C4-4BCD-93E2-E3B085C9AB24}">
+                <p16:designElem xmlns:p16="http://schemas.microsoft.com/office/powerpoint/2015/main" val="1"/>
+              </p:ext>
+            </p:extLst>
+          </p:nvPr>
+        </p:nvSpPr>
+        <p:spPr>
+          <a:xfrm>
+            <a:off x="4602050" y="650160"/>
+            <a:ext cx="2987899" cy="2987899"/>
+          </a:xfrm>
+          <a:prstGeom prst="arc">
+            <a:avLst>
+              <a:gd name="adj1" fmla="val 14441841"/>
+              <a:gd name="adj2" fmla="val 0"/>
+            </a:avLst>
+          </a:prstGeom>
+          <a:ln w="127000" cap="rnd">
+            <a:solidFill>
+              <a:schemeClr val="accent4"/>
+            </a:solidFill>
+            <a:prstDash val="dash"/>
+            <a:miter lim="800000"/>
+          </a:ln>
+        </p:spPr>
+        <p:style>
+          <a:lnRef idx="1">
+            <a:schemeClr val="accent1"/>
+          </a:lnRef>
+          <a:fillRef idx="0">
+            <a:schemeClr val="accent1"/>
+          </a:fillRef>
+          <a:effectRef idx="0">
+            <a:schemeClr val="accent1"/>
+          </a:effectRef>
+          <a:fontRef idx="minor">
+            <a:schemeClr val="tx1"/>
+          </a:fontRef>
+        </p:style>
+        <p:txBody>
+          <a:bodyPr rtlCol="0" anchor="ctr"/>
+          <a:lstStyle/>
+          <a:p>
+            <a:pPr marL="0" marR="0" lvl="0" indent="0" algn="ctr" defTabSz="914400" rtl="0" eaLnBrk="1" fontAlgn="auto" latinLnBrk="0" hangingPunct="1">
+              <a:lnSpc>
+                <a:spcPct val="100000"/>
+              </a:lnSpc>
+              <a:spcBef>
+                <a:spcPts val="0"/>
+              </a:spcBef>
+              <a:spcAft>
+                <a:spcPts val="0"/>
+              </a:spcAft>
+              <a:buClrTx/>
+              <a:buSzTx/>
+              <a:buFontTx/>
+              <a:buNone/>
+              <a:tabLst/>
+              <a:defRPr/>
+            </a:pPr>
+            <a:endParaRPr kumimoji="0" lang="en-US" sz="1800" b="0" i="0" u="none" strike="noStrike" kern="1200" cap="none" spc="0" normalizeH="0" baseline="0" noProof="0">
+              <a:ln>
+                <a:noFill/>
+              </a:ln>
+              <a:solidFill>
+                <a:srgbClr val="000000"/>
+              </a:solidFill>
+              <a:effectLst/>
+              <a:uLnTx/>
+              <a:uFillTx/>
+              <a:latin typeface="Calibri" panose="020F0502020204030204"/>
+              <a:ea typeface="+mn-ea"/>
+              <a:cs typeface="+mn-cs"/>
+            </a:endParaRPr>
+          </a:p>
+        </p:txBody>
+      </p:sp>
+      <p:sp>
+        <p:nvSpPr>
+          <p:cNvPr id="2" name="Title 1">
+            <a:extLst>
+              <a:ext uri="{FF2B5EF4-FFF2-40B4-BE49-F238E27FC236}">
+                <a16:creationId xmlns:a16="http://schemas.microsoft.com/office/drawing/2014/main" id="{68B1C484-4F0E-2A25-BF95-E241F5813A64}"/>
+              </a:ext>
+            </a:extLst>
+          </p:cNvPr>
+          <p:cNvSpPr>
+            <a:spLocks noGrp="1"/>
+          </p:cNvSpPr>
+          <p:nvPr>
+            <p:ph type="title"/>
+          </p:nvPr>
+        </p:nvSpPr>
+        <p:spPr>
+          <a:xfrm>
+            <a:off x="838201" y="479493"/>
+            <a:ext cx="5257800" cy="1325563"/>
+          </a:xfrm>
+        </p:spPr>
+        <p:txBody>
+          <a:bodyPr>
+            <a:normAutofit/>
+          </a:bodyPr>
+          <a:lstStyle/>
+          <a:p>
+            <a:r>
+              <a:rPr lang="en-US" sz="3100" dirty="0"/>
+              <a:t>Vertical Formatting – Vertical Distance – Conceptual Affinity</a:t>
+            </a:r>
+          </a:p>
+        </p:txBody>
+      </p:sp>
+      <p:sp>
+        <p:nvSpPr>
+          <p:cNvPr id="3" name="Content Placeholder 2">
+            <a:extLst>
+              <a:ext uri="{FF2B5EF4-FFF2-40B4-BE49-F238E27FC236}">
+                <a16:creationId xmlns:a16="http://schemas.microsoft.com/office/drawing/2014/main" id="{4DA065E7-E9FF-25DC-8536-4EAC242949A2}"/>
+              </a:ext>
+            </a:extLst>
+          </p:cNvPr>
+          <p:cNvSpPr>
+            <a:spLocks noGrp="1"/>
+          </p:cNvSpPr>
+          <p:nvPr>
+            <p:ph idx="1"/>
+          </p:nvPr>
+        </p:nvSpPr>
+        <p:spPr>
+          <a:xfrm>
+            <a:off x="838201" y="1984443"/>
+            <a:ext cx="5257800" cy="4192520"/>
+          </a:xfrm>
+        </p:spPr>
+        <p:txBody>
+          <a:bodyPr>
+            <a:normAutofit/>
+          </a:bodyPr>
+          <a:lstStyle/>
+          <a:p>
+            <a:r>
+              <a:rPr lang="en-US" sz="2200" dirty="0"/>
+              <a:t>Functions like </a:t>
+            </a:r>
+            <a:r>
+              <a:rPr lang="en-US" sz="2000" dirty="0" err="1"/>
+              <a:t>assertTrue</a:t>
+            </a:r>
+            <a:endParaRPr lang="en-US" sz="2200" dirty="0"/>
+          </a:p>
+          <a:p>
+            <a:pPr marL="0" indent="0">
+              <a:buNone/>
+            </a:pPr>
+            <a:r>
+              <a:rPr lang="en-US" sz="2200" dirty="0"/>
+              <a:t>   and </a:t>
+            </a:r>
+            <a:r>
+              <a:rPr lang="en-US" sz="2000" dirty="0" err="1"/>
+              <a:t>assertFalse</a:t>
+            </a:r>
+            <a:r>
+              <a:rPr lang="en-US" sz="2200" dirty="0"/>
+              <a:t> in the Assert</a:t>
+            </a:r>
+          </a:p>
+          <a:p>
+            <a:pPr marL="0" indent="0">
+              <a:buNone/>
+            </a:pPr>
+            <a:r>
+              <a:rPr lang="en-US" sz="2200" dirty="0"/>
+              <a:t>   class all deal with similar tasks,</a:t>
+            </a:r>
+          </a:p>
+          <a:p>
+            <a:pPr marL="0" indent="0">
+              <a:buNone/>
+            </a:pPr>
+            <a:r>
+              <a:rPr lang="en-US" sz="2200" dirty="0"/>
+              <a:t>   use similar names, and follow</a:t>
+            </a:r>
+          </a:p>
+          <a:p>
+            <a:pPr marL="0" indent="0">
+              <a:buNone/>
+            </a:pPr>
+            <a:r>
+              <a:rPr lang="en-US" sz="2200" dirty="0"/>
+              <a:t>   the same pattern. Even if they</a:t>
+            </a:r>
+          </a:p>
+          <a:p>
+            <a:pPr marL="0" indent="0">
+              <a:buNone/>
+            </a:pPr>
+            <a:r>
+              <a:rPr lang="en-US" sz="2200" dirty="0"/>
+              <a:t>   don’t directly call each other,</a:t>
+            </a:r>
+          </a:p>
+          <a:p>
+            <a:pPr marL="0" indent="0">
+              <a:buNone/>
+            </a:pPr>
+            <a:r>
+              <a:rPr lang="en-US" sz="2200" dirty="0"/>
+              <a:t>   they should still be placed close    together in the code to make</a:t>
+            </a:r>
+          </a:p>
+          <a:p>
+            <a:pPr marL="0" indent="0">
+              <a:buNone/>
+            </a:pPr>
+            <a:r>
+              <a:rPr lang="en-US" sz="2200" dirty="0"/>
+              <a:t>   it easier to understand and maintain.</a:t>
+            </a:r>
+          </a:p>
+        </p:txBody>
+      </p:sp>
+    </p:spTree>
+    <p:extLst>
+      <p:ext uri="{BB962C8B-B14F-4D97-AF65-F5344CB8AC3E}">
+        <p14:creationId xmlns:p14="http://schemas.microsoft.com/office/powerpoint/2010/main" val="451781380"/>
+      </p:ext>
+    </p:extLst>
+  </p:cSld>
+  <p:clrMapOvr>
+    <a:masterClrMapping/>
+  </p:clrMapOvr>
+</p:sld>
+</file>
+
+<file path=ppt/slides/slide13.xml><?xml version="1.0" encoding="utf-8"?>
+<p:sld xmlns:a="http://schemas.openxmlformats.org/drawingml/2006/main" xmlns:r="http://schemas.openxmlformats.org/officeDocument/2006/relationships" xmlns:p="http://schemas.openxmlformats.org/presentationml/2006/main">
+  <p:cSld>
+    <p:spTree>
+      <p:nvGrpSpPr>
+        <p:cNvPr id="1" name=""/>
+        <p:cNvGrpSpPr/>
+        <p:nvPr/>
+      </p:nvGrpSpPr>
+      <p:grpSpPr>
+        <a:xfrm>
+          <a:off x="0" y="0"/>
+          <a:ext cx="0" cy="0"/>
+          <a:chOff x="0" y="0"/>
+          <a:chExt cx="0" cy="0"/>
+        </a:xfrm>
+      </p:grpSpPr>
+      <p:sp>
+        <p:nvSpPr>
+          <p:cNvPr id="2" name="Title 1">
+            <a:extLst>
+              <a:ext uri="{FF2B5EF4-FFF2-40B4-BE49-F238E27FC236}">
+                <a16:creationId xmlns:a16="http://schemas.microsoft.com/office/drawing/2014/main" id="{9E618267-207A-65FB-5208-6369AC8FA13D}"/>
+              </a:ext>
+            </a:extLst>
+          </p:cNvPr>
+          <p:cNvSpPr>
+            <a:spLocks noGrp="1"/>
+          </p:cNvSpPr>
+          <p:nvPr>
+            <p:ph type="title"/>
+          </p:nvPr>
+        </p:nvSpPr>
+        <p:spPr/>
+        <p:txBody>
+          <a:bodyPr/>
+          <a:lstStyle/>
+          <a:p>
+            <a:r>
+              <a:rPr lang="en-US" sz="4400" dirty="0"/>
+              <a:t>Vertical Formatting – Vertical Ordering</a:t>
+            </a:r>
+            <a:endParaRPr lang="en-US" dirty="0"/>
+          </a:p>
+        </p:txBody>
+      </p:sp>
+      <p:sp>
+        <p:nvSpPr>
+          <p:cNvPr id="3" name="Content Placeholder 2">
+            <a:extLst>
+              <a:ext uri="{FF2B5EF4-FFF2-40B4-BE49-F238E27FC236}">
+                <a16:creationId xmlns:a16="http://schemas.microsoft.com/office/drawing/2014/main" id="{093874EE-8350-38BB-5450-936B011A825C}"/>
+              </a:ext>
+            </a:extLst>
+          </p:cNvPr>
+          <p:cNvSpPr>
+            <a:spLocks noGrp="1"/>
+          </p:cNvSpPr>
+          <p:nvPr>
+            <p:ph idx="1"/>
+          </p:nvPr>
+        </p:nvSpPr>
+        <p:spPr/>
+        <p:txBody>
+          <a:bodyPr/>
+          <a:lstStyle/>
+          <a:p>
+            <a:endParaRPr lang="en-US" dirty="0"/>
+          </a:p>
+          <a:p>
+            <a:r>
+              <a:rPr lang="en-US" dirty="0"/>
+              <a:t>In general, we want function call dependencies to point the downward direction.</a:t>
+            </a:r>
+          </a:p>
+          <a:p>
+            <a:pPr lvl="1"/>
+            <a:r>
+              <a:rPr lang="en-US" dirty="0"/>
+              <a:t>That is, a function that is called should be below a function that does the calling.</a:t>
+            </a:r>
+          </a:p>
+          <a:p>
+            <a:endParaRPr lang="en-US" dirty="0"/>
+          </a:p>
+          <a:p>
+            <a:r>
+              <a:rPr lang="en-US" dirty="0"/>
+              <a:t>We expect the low-level details to come last.</a:t>
+            </a:r>
+          </a:p>
+        </p:txBody>
+      </p:sp>
+    </p:spTree>
+    <p:extLst>
+      <p:ext uri="{BB962C8B-B14F-4D97-AF65-F5344CB8AC3E}">
+        <p14:creationId xmlns:p14="http://schemas.microsoft.com/office/powerpoint/2010/main" val="3668620891"/>
+      </p:ext>
+    </p:extLst>
+  </p:cSld>
+  <p:clrMapOvr>
+    <a:masterClrMapping/>
+  </p:clrMapOvr>
+</p:sld>
+</file>
+
 <file path=ppt/slides/slide2.xml><?xml version="1.0" encoding="utf-8"?>
 <p:sld xmlns:a="http://schemas.openxmlformats.org/drawingml/2006/main" xmlns:r="http://schemas.openxmlformats.org/officeDocument/2006/relationships" xmlns:p="http://schemas.openxmlformats.org/presentationml/2006/main">
   <p:cSld>
@@ -7726,6 +9203,233 @@
     <p:extLst>
       <p:ext uri="{BB962C8B-B14F-4D97-AF65-F5344CB8AC3E}">
         <p14:creationId xmlns:p14="http://schemas.microsoft.com/office/powerpoint/2010/main" val="623108699"/>
+      </p:ext>
+    </p:extLst>
+  </p:cSld>
+  <p:clrMapOvr>
+    <a:masterClrMapping/>
+  </p:clrMapOvr>
+</p:sld>
+</file>
+
+<file path=ppt/slides/slide8.xml><?xml version="1.0" encoding="utf-8"?>
+<p:sld xmlns:a="http://schemas.openxmlformats.org/drawingml/2006/main" xmlns:r="http://schemas.openxmlformats.org/officeDocument/2006/relationships" xmlns:p="http://schemas.openxmlformats.org/presentationml/2006/main">
+  <p:cSld>
+    <p:spTree>
+      <p:nvGrpSpPr>
+        <p:cNvPr id="1" name=""/>
+        <p:cNvGrpSpPr/>
+        <p:nvPr/>
+      </p:nvGrpSpPr>
+      <p:grpSpPr>
+        <a:xfrm>
+          <a:off x="0" y="0"/>
+          <a:ext cx="0" cy="0"/>
+          <a:chOff x="0" y="0"/>
+          <a:chExt cx="0" cy="0"/>
+        </a:xfrm>
+      </p:grpSpPr>
+      <p:sp>
+        <p:nvSpPr>
+          <p:cNvPr id="2" name="Title 1">
+            <a:extLst>
+              <a:ext uri="{FF2B5EF4-FFF2-40B4-BE49-F238E27FC236}">
+                <a16:creationId xmlns:a16="http://schemas.microsoft.com/office/drawing/2014/main" id="{9AA29A48-61CA-6DDF-A2ED-A94E759A56B8}"/>
+              </a:ext>
+            </a:extLst>
+          </p:cNvPr>
+          <p:cNvSpPr>
+            <a:spLocks noGrp="1"/>
+          </p:cNvSpPr>
+          <p:nvPr>
+            <p:ph type="title"/>
+          </p:nvPr>
+        </p:nvSpPr>
+        <p:spPr/>
+        <p:txBody>
+          <a:bodyPr/>
+          <a:lstStyle/>
+          <a:p>
+            <a:r>
+              <a:rPr lang="en-US" dirty="0"/>
+              <a:t>Vertical Formatting – Vertical Distance</a:t>
+            </a:r>
+          </a:p>
+        </p:txBody>
+      </p:sp>
+      <p:sp>
+        <p:nvSpPr>
+          <p:cNvPr id="3" name="Content Placeholder 2">
+            <a:extLst>
+              <a:ext uri="{FF2B5EF4-FFF2-40B4-BE49-F238E27FC236}">
+                <a16:creationId xmlns:a16="http://schemas.microsoft.com/office/drawing/2014/main" id="{9D0F331E-D6F0-44B6-6114-884EF4206F8B}"/>
+              </a:ext>
+            </a:extLst>
+          </p:cNvPr>
+          <p:cNvSpPr>
+            <a:spLocks noGrp="1"/>
+          </p:cNvSpPr>
+          <p:nvPr>
+            <p:ph idx="1"/>
+          </p:nvPr>
+        </p:nvSpPr>
+        <p:spPr/>
+        <p:txBody>
+          <a:bodyPr/>
+          <a:lstStyle/>
+          <a:p>
+            <a:r>
+              <a:rPr lang="en-US" dirty="0"/>
+              <a:t>Concepts that are closely related should be kept vertically close to each other.</a:t>
+            </a:r>
+          </a:p>
+          <a:p>
+            <a:pPr lvl="1"/>
+            <a:r>
+              <a:rPr lang="en-US" dirty="0"/>
+              <a:t>This doesn’t work if concepts are separated into different files.</a:t>
+            </a:r>
+          </a:p>
+          <a:p>
+            <a:pPr lvl="1"/>
+            <a:r>
+              <a:rPr lang="en-US" dirty="0"/>
+              <a:t>But </a:t>
+            </a:r>
+            <a:r>
+              <a:rPr lang="en-US" b="1" dirty="0"/>
+              <a:t>related concepts shouldn’t be separated into different files</a:t>
+            </a:r>
+            <a:r>
+              <a:rPr lang="en-US" dirty="0"/>
+              <a:t>, unless you have a good reason.</a:t>
+            </a:r>
+          </a:p>
+          <a:p>
+            <a:pPr lvl="1"/>
+            <a:r>
+              <a:rPr lang="en-US" dirty="0"/>
+              <a:t>This one reason thar protected variables should be avoided.</a:t>
+            </a:r>
+          </a:p>
+          <a:p>
+            <a:r>
+              <a:rPr lang="en-US" dirty="0"/>
+              <a:t>So, closely related concepts should be placed near each other in the code to make it easier to understand without jumping around.</a:t>
+            </a:r>
+          </a:p>
+        </p:txBody>
+      </p:sp>
+    </p:spTree>
+    <p:extLst>
+      <p:ext uri="{BB962C8B-B14F-4D97-AF65-F5344CB8AC3E}">
+        <p14:creationId xmlns:p14="http://schemas.microsoft.com/office/powerpoint/2010/main" val="3276403466"/>
+      </p:ext>
+    </p:extLst>
+  </p:cSld>
+  <p:clrMapOvr>
+    <a:masterClrMapping/>
+  </p:clrMapOvr>
+</p:sld>
+</file>
+
+<file path=ppt/slides/slide9.xml><?xml version="1.0" encoding="utf-8"?>
+<p:sld xmlns:a="http://schemas.openxmlformats.org/drawingml/2006/main" xmlns:r="http://schemas.openxmlformats.org/officeDocument/2006/relationships" xmlns:p="http://schemas.openxmlformats.org/presentationml/2006/main">
+  <p:cSld>
+    <p:spTree>
+      <p:nvGrpSpPr>
+        <p:cNvPr id="1" name=""/>
+        <p:cNvGrpSpPr/>
+        <p:nvPr/>
+      </p:nvGrpSpPr>
+      <p:grpSpPr>
+        <a:xfrm>
+          <a:off x="0" y="0"/>
+          <a:ext cx="0" cy="0"/>
+          <a:chOff x="0" y="0"/>
+          <a:chExt cx="0" cy="0"/>
+        </a:xfrm>
+      </p:grpSpPr>
+      <p:sp>
+        <p:nvSpPr>
+          <p:cNvPr id="2" name="Title 1">
+            <a:extLst>
+              <a:ext uri="{FF2B5EF4-FFF2-40B4-BE49-F238E27FC236}">
+                <a16:creationId xmlns:a16="http://schemas.microsoft.com/office/drawing/2014/main" id="{31C51877-F0E7-2EA6-4E57-19CE43207DDD}"/>
+              </a:ext>
+            </a:extLst>
+          </p:cNvPr>
+          <p:cNvSpPr>
+            <a:spLocks noGrp="1"/>
+          </p:cNvSpPr>
+          <p:nvPr>
+            <p:ph type="title"/>
+          </p:nvPr>
+        </p:nvSpPr>
+        <p:spPr/>
+        <p:txBody>
+          <a:bodyPr/>
+          <a:lstStyle/>
+          <a:p>
+            <a:r>
+              <a:rPr lang="en-US" dirty="0"/>
+              <a:t>Vertical Formatting – Vertical Distance – Variable Declarations</a:t>
+            </a:r>
+          </a:p>
+        </p:txBody>
+      </p:sp>
+      <p:sp>
+        <p:nvSpPr>
+          <p:cNvPr id="3" name="Content Placeholder 2">
+            <a:extLst>
+              <a:ext uri="{FF2B5EF4-FFF2-40B4-BE49-F238E27FC236}">
+                <a16:creationId xmlns:a16="http://schemas.microsoft.com/office/drawing/2014/main" id="{9C782444-2948-F0B4-6F8F-8EBF64F22142}"/>
+              </a:ext>
+            </a:extLst>
+          </p:cNvPr>
+          <p:cNvSpPr>
+            <a:spLocks noGrp="1"/>
+          </p:cNvSpPr>
+          <p:nvPr>
+            <p:ph idx="1"/>
+          </p:nvPr>
+        </p:nvSpPr>
+        <p:spPr/>
+        <p:txBody>
+          <a:bodyPr/>
+          <a:lstStyle/>
+          <a:p>
+            <a:r>
+              <a:rPr lang="en-US" dirty="0"/>
+              <a:t>Variables should be declared as close to their usage as possible.</a:t>
+            </a:r>
+          </a:p>
+          <a:p>
+            <a:r>
+              <a:rPr lang="en-US" dirty="0"/>
+              <a:t>Control variables for loops should be declared within the loop statement.</a:t>
+            </a:r>
+          </a:p>
+          <a:p>
+            <a:r>
+              <a:rPr lang="en-US" dirty="0"/>
+              <a:t>In rare cases, a variable might be declared at the top of a block or just before a loop in a long-</a:t>
+            </a:r>
+            <a:r>
+              <a:rPr lang="en-US" dirty="0" err="1"/>
+              <a:t>ish</a:t>
+            </a:r>
+            <a:r>
+              <a:rPr lang="en-US" dirty="0"/>
+              <a:t> function.</a:t>
+            </a:r>
+          </a:p>
+        </p:txBody>
+      </p:sp>
+    </p:spTree>
+    <p:extLst>
+      <p:ext uri="{BB962C8B-B14F-4D97-AF65-F5344CB8AC3E}">
+        <p14:creationId xmlns:p14="http://schemas.microsoft.com/office/powerpoint/2010/main" val="2510959742"/>
       </p:ext>
     </p:extLst>
   </p:cSld>
@@ -7934,4 +9638,319 @@
     </a:ext>
   </a:extLst>
 </a:theme>
+</file>
+
+<file path=ppt/theme/theme2.xml><?xml version="1.0" encoding="utf-8"?>
+<a:theme xmlns:a="http://schemas.openxmlformats.org/drawingml/2006/main" name="Office Theme">
+  <a:themeElements>
+    <a:clrScheme name="Office">
+      <a:dk1>
+        <a:sysClr val="windowText" lastClr="000000"/>
+      </a:dk1>
+      <a:lt1>
+        <a:sysClr val="window" lastClr="FFFFFF"/>
+      </a:lt1>
+      <a:dk2>
+        <a:srgbClr val="0E2841"/>
+      </a:dk2>
+      <a:lt2>
+        <a:srgbClr val="E8E8E8"/>
+      </a:lt2>
+      <a:accent1>
+        <a:srgbClr val="156082"/>
+      </a:accent1>
+      <a:accent2>
+        <a:srgbClr val="E97132"/>
+      </a:accent2>
+      <a:accent3>
+        <a:srgbClr val="196B24"/>
+      </a:accent3>
+      <a:accent4>
+        <a:srgbClr val="0F9ED5"/>
+      </a:accent4>
+      <a:accent5>
+        <a:srgbClr val="A02B93"/>
+      </a:accent5>
+      <a:accent6>
+        <a:srgbClr val="4EA72E"/>
+      </a:accent6>
+      <a:hlink>
+        <a:srgbClr val="467886"/>
+      </a:hlink>
+      <a:folHlink>
+        <a:srgbClr val="96607D"/>
+      </a:folHlink>
+    </a:clrScheme>
+    <a:fontScheme name="Office">
+      <a:majorFont>
+        <a:latin typeface="Aptos Display" panose="02110004020202020204"/>
+        <a:ea typeface=""/>
+        <a:cs typeface=""/>
+        <a:font script="Jpan" typeface="游ゴシック Light"/>
+        <a:font script="Hang" typeface="맑은 고딕"/>
+        <a:font script="Hans" typeface="等线 Light"/>
+        <a:font script="Hant" typeface="新細明體"/>
+        <a:font script="Arab" typeface="Times New Roman"/>
+        <a:font script="Hebr" typeface="Times New Roman"/>
+        <a:font script="Thai" typeface="Angsana New"/>
+        <a:font script="Ethi" typeface="Nyala"/>
+        <a:font script="Beng" typeface="Vrinda"/>
+        <a:font script="Gujr" typeface="Shruti"/>
+        <a:font script="Khmr" typeface="MoolBoran"/>
+        <a:font script="Knda" typeface="Tunga"/>
+        <a:font script="Guru" typeface="Raavi"/>
+        <a:font script="Cans" typeface="Euphemia"/>
+        <a:font script="Cher" typeface="Plantagenet Cherokee"/>
+        <a:font script="Yiii" typeface="Microsoft Yi Baiti"/>
+        <a:font script="Tibt" typeface="Microsoft Himalaya"/>
+        <a:font script="Thaa" typeface="MV Boli"/>
+        <a:font script="Deva" typeface="Mangal"/>
+        <a:font script="Telu" typeface="Gautami"/>
+        <a:font script="Taml" typeface="Latha"/>
+        <a:font script="Syrc" typeface="Estrangelo Edessa"/>
+        <a:font script="Orya" typeface="Kalinga"/>
+        <a:font script="Mlym" typeface="Kartika"/>
+        <a:font script="Laoo" typeface="DokChampa"/>
+        <a:font script="Sinh" typeface="Iskoola Pota"/>
+        <a:font script="Mong" typeface="Mongolian Baiti"/>
+        <a:font script="Viet" typeface="Times New Roman"/>
+        <a:font script="Uigh" typeface="Microsoft Uighur"/>
+        <a:font script="Geor" typeface="Sylfaen"/>
+        <a:font script="Armn" typeface="Arial"/>
+        <a:font script="Bugi" typeface="Leelawadee UI"/>
+        <a:font script="Bopo" typeface="Microsoft JhengHei"/>
+        <a:font script="Java" typeface="Javanese Text"/>
+        <a:font script="Lisu" typeface="Segoe UI"/>
+        <a:font script="Mymr" typeface="Myanmar Text"/>
+        <a:font script="Nkoo" typeface="Ebrima"/>
+        <a:font script="Olck" typeface="Nirmala UI"/>
+        <a:font script="Osma" typeface="Ebrima"/>
+        <a:font script="Phag" typeface="Phagspa"/>
+        <a:font script="Syrn" typeface="Estrangelo Edessa"/>
+        <a:font script="Syrj" typeface="Estrangelo Edessa"/>
+        <a:font script="Syre" typeface="Estrangelo Edessa"/>
+        <a:font script="Sora" typeface="Nirmala UI"/>
+        <a:font script="Tale" typeface="Microsoft Tai Le"/>
+        <a:font script="Talu" typeface="Microsoft New Tai Lue"/>
+        <a:font script="Tfng" typeface="Ebrima"/>
+      </a:majorFont>
+      <a:minorFont>
+        <a:latin typeface="Aptos" panose="02110004020202020204"/>
+        <a:ea typeface=""/>
+        <a:cs typeface=""/>
+        <a:font script="Jpan" typeface="游ゴシック"/>
+        <a:font script="Hang" typeface="맑은 고딕"/>
+        <a:font script="Hans" typeface="等线"/>
+        <a:font script="Hant" typeface="新細明體"/>
+        <a:font script="Arab" typeface="Arial"/>
+        <a:font script="Hebr" typeface="Arial"/>
+        <a:font script="Thai" typeface="Cordia New"/>
+        <a:font script="Ethi" typeface="Nyala"/>
+        <a:font script="Beng" typeface="Vrinda"/>
+        <a:font script="Gujr" typeface="Shruti"/>
+        <a:font script="Khmr" typeface="DaunPenh"/>
+        <a:font script="Knda" typeface="Tunga"/>
+        <a:font script="Guru" typeface="Raavi"/>
+        <a:font script="Cans" typeface="Euphemia"/>
+        <a:font script="Cher" typeface="Plantagenet Cherokee"/>
+        <a:font script="Yiii" typeface="Microsoft Yi Baiti"/>
+        <a:font script="Tibt" typeface="Microsoft Himalaya"/>
+        <a:font script="Thaa" typeface="MV Boli"/>
+        <a:font script="Deva" typeface="Mangal"/>
+        <a:font script="Telu" typeface="Gautami"/>
+        <a:font script="Taml" typeface="Latha"/>
+        <a:font script="Syrc" typeface="Estrangelo Edessa"/>
+        <a:font script="Orya" typeface="Kalinga"/>
+        <a:font script="Mlym" typeface="Kartika"/>
+        <a:font script="Laoo" typeface="DokChampa"/>
+        <a:font script="Sinh" typeface="Iskoola Pota"/>
+        <a:font script="Mong" typeface="Mongolian Baiti"/>
+        <a:font script="Viet" typeface="Arial"/>
+        <a:font script="Uigh" typeface="Microsoft Uighur"/>
+        <a:font script="Geor" typeface="Sylfaen"/>
+        <a:font script="Armn" typeface="Arial"/>
+        <a:font script="Bugi" typeface="Leelawadee UI"/>
+        <a:font script="Bopo" typeface="Microsoft JhengHei"/>
+        <a:font script="Java" typeface="Javanese Text"/>
+        <a:font script="Lisu" typeface="Segoe UI"/>
+        <a:font script="Mymr" typeface="Myanmar Text"/>
+        <a:font script="Nkoo" typeface="Ebrima"/>
+        <a:font script="Olck" typeface="Nirmala UI"/>
+        <a:font script="Osma" typeface="Ebrima"/>
+        <a:font script="Phag" typeface="Phagspa"/>
+        <a:font script="Syrn" typeface="Estrangelo Edessa"/>
+        <a:font script="Syrj" typeface="Estrangelo Edessa"/>
+        <a:font script="Syre" typeface="Estrangelo Edessa"/>
+        <a:font script="Sora" typeface="Nirmala UI"/>
+        <a:font script="Tale" typeface="Microsoft Tai Le"/>
+        <a:font script="Talu" typeface="Microsoft New Tai Lue"/>
+        <a:font script="Tfng" typeface="Ebrima"/>
+      </a:minorFont>
+    </a:fontScheme>
+    <a:fmtScheme name="Office">
+      <a:fillStyleLst>
+        <a:solidFill>
+          <a:schemeClr val="phClr"/>
+        </a:solidFill>
+        <a:gradFill rotWithShape="1">
+          <a:gsLst>
+            <a:gs pos="0">
+              <a:schemeClr val="phClr">
+                <a:lumMod val="110000"/>
+                <a:satMod val="105000"/>
+                <a:tint val="67000"/>
+              </a:schemeClr>
+            </a:gs>
+            <a:gs pos="50000">
+              <a:schemeClr val="phClr">
+                <a:lumMod val="105000"/>
+                <a:satMod val="103000"/>
+                <a:tint val="73000"/>
+              </a:schemeClr>
+            </a:gs>
+            <a:gs pos="100000">
+              <a:schemeClr val="phClr">
+                <a:lumMod val="105000"/>
+                <a:satMod val="109000"/>
+                <a:tint val="81000"/>
+              </a:schemeClr>
+            </a:gs>
+          </a:gsLst>
+          <a:lin ang="5400000" scaled="0"/>
+        </a:gradFill>
+        <a:gradFill rotWithShape="1">
+          <a:gsLst>
+            <a:gs pos="0">
+              <a:schemeClr val="phClr">
+                <a:satMod val="103000"/>
+                <a:lumMod val="102000"/>
+                <a:tint val="94000"/>
+              </a:schemeClr>
+            </a:gs>
+            <a:gs pos="50000">
+              <a:schemeClr val="phClr">
+                <a:satMod val="110000"/>
+                <a:lumMod val="100000"/>
+                <a:shade val="100000"/>
+              </a:schemeClr>
+            </a:gs>
+            <a:gs pos="100000">
+              <a:schemeClr val="phClr">
+                <a:lumMod val="99000"/>
+                <a:satMod val="120000"/>
+                <a:shade val="78000"/>
+              </a:schemeClr>
+            </a:gs>
+          </a:gsLst>
+          <a:lin ang="5400000" scaled="0"/>
+        </a:gradFill>
+      </a:fillStyleLst>
+      <a:lnStyleLst>
+        <a:ln w="12700" cap="flat" cmpd="sng" algn="ctr">
+          <a:solidFill>
+            <a:schemeClr val="phClr"/>
+          </a:solidFill>
+          <a:prstDash val="solid"/>
+          <a:miter lim="800000"/>
+        </a:ln>
+        <a:ln w="19050" cap="flat" cmpd="sng" algn="ctr">
+          <a:solidFill>
+            <a:schemeClr val="phClr"/>
+          </a:solidFill>
+          <a:prstDash val="solid"/>
+          <a:miter lim="800000"/>
+        </a:ln>
+        <a:ln w="25400" cap="flat" cmpd="sng" algn="ctr">
+          <a:solidFill>
+            <a:schemeClr val="phClr"/>
+          </a:solidFill>
+          <a:prstDash val="solid"/>
+          <a:miter lim="800000"/>
+        </a:ln>
+      </a:lnStyleLst>
+      <a:effectStyleLst>
+        <a:effectStyle>
+          <a:effectLst/>
+        </a:effectStyle>
+        <a:effectStyle>
+          <a:effectLst/>
+        </a:effectStyle>
+        <a:effectStyle>
+          <a:effectLst>
+            <a:outerShdw blurRad="57150" dist="19050" dir="5400000" algn="ctr" rotWithShape="0">
+              <a:srgbClr val="000000">
+                <a:alpha val="63000"/>
+              </a:srgbClr>
+            </a:outerShdw>
+          </a:effectLst>
+        </a:effectStyle>
+      </a:effectStyleLst>
+      <a:bgFillStyleLst>
+        <a:solidFill>
+          <a:schemeClr val="phClr"/>
+        </a:solidFill>
+        <a:solidFill>
+          <a:schemeClr val="phClr">
+            <a:tint val="95000"/>
+            <a:satMod val="170000"/>
+          </a:schemeClr>
+        </a:solidFill>
+        <a:gradFill rotWithShape="1">
+          <a:gsLst>
+            <a:gs pos="0">
+              <a:schemeClr val="phClr">
+                <a:tint val="93000"/>
+                <a:satMod val="150000"/>
+                <a:shade val="98000"/>
+                <a:lumMod val="102000"/>
+              </a:schemeClr>
+            </a:gs>
+            <a:gs pos="50000">
+              <a:schemeClr val="phClr">
+                <a:tint val="98000"/>
+                <a:satMod val="130000"/>
+                <a:shade val="90000"/>
+                <a:lumMod val="103000"/>
+              </a:schemeClr>
+            </a:gs>
+            <a:gs pos="100000">
+              <a:schemeClr val="phClr">
+                <a:shade val="63000"/>
+                <a:satMod val="120000"/>
+              </a:schemeClr>
+            </a:gs>
+          </a:gsLst>
+          <a:lin ang="5400000" scaled="0"/>
+        </a:gradFill>
+      </a:bgFillStyleLst>
+    </a:fmtScheme>
+  </a:themeElements>
+  <a:objectDefaults>
+    <a:lnDef>
+      <a:spPr/>
+      <a:bodyPr/>
+      <a:lstStyle/>
+      <a:style>
+        <a:lnRef idx="2">
+          <a:schemeClr val="accent1"/>
+        </a:lnRef>
+        <a:fillRef idx="0">
+          <a:schemeClr val="accent1"/>
+        </a:fillRef>
+        <a:effectRef idx="1">
+          <a:schemeClr val="accent1"/>
+        </a:effectRef>
+        <a:fontRef idx="minor">
+          <a:schemeClr val="tx1"/>
+        </a:fontRef>
+      </a:style>
+    </a:lnDef>
+  </a:objectDefaults>
+  <a:extraClrSchemeLst/>
+  <a:extLst>
+    <a:ext uri="{05A4C25C-085E-4340-85A3-A5531E510DB2}">
+      <thm15:themeFamily xmlns:thm15="http://schemas.microsoft.com/office/thememl/2012/main" name="Office Theme" id="{2E142A2C-CD16-42D6-873A-C26D2A0506FA}" vid="{1BDDFF52-6CD6-40A5-AB3C-68EB2F1E4D0A}"/>
+    </a:ext>
+  </a:extLst>
+</a:theme>
 </file>
</xml_diff>